<commit_message>
Put some notes in for Jay
</commit_message>
<xml_diff>
--- a/Fox Fox Foo Final.pptx
+++ b/Fox Fox Foo Final.pptx
@@ -990,9 +990,58 @@
           <a:bodyPr/>
           <a:lstStyle/>
           <a:p>
+            <a:pPr marL="0" marR="0" lvl="0" indent="0" algn="l" defTabSz="914400" rtl="0" eaLnBrk="1" fontAlgn="auto" latinLnBrk="0" hangingPunct="1">
+              <a:lnSpc>
+                <a:spcPct val="100000"/>
+              </a:lnSpc>
+              <a:spcBef>
+                <a:spcPts val="0"/>
+              </a:spcBef>
+              <a:spcAft>
+                <a:spcPts val="0"/>
+              </a:spcAft>
+              <a:buClrTx/>
+              <a:buSzTx/>
+              <a:buFontTx/>
+              <a:buNone/>
+              <a:tabLst/>
+              <a:defRPr/>
+            </a:pPr>
+            <a:r>
+              <a:rPr lang="en-US" dirty="0">
+                <a:hlinkClick r:id="rId3"/>
+              </a:rPr>
+              <a:t>https://github.com/KaiTuyt/ENGR-1411-Project</a:t>
+            </a:r>
+            <a:endParaRPr lang="en-US" dirty="0"/>
+          </a:p>
+          <a:p>
+            <a:pPr marL="0" marR="0" lvl="0" indent="0" algn="l" defTabSz="914400" rtl="0" eaLnBrk="1" fontAlgn="auto" latinLnBrk="0" hangingPunct="1">
+              <a:lnSpc>
+                <a:spcPct val="100000"/>
+              </a:lnSpc>
+              <a:spcBef>
+                <a:spcPts val="0"/>
+              </a:spcBef>
+              <a:spcAft>
+                <a:spcPts val="0"/>
+              </a:spcAft>
+              <a:buClrTx/>
+              <a:buSzTx/>
+              <a:buFontTx/>
+              <a:buNone/>
+              <a:tabLst/>
+              <a:defRPr/>
+            </a:pPr>
             <a:r>
               <a:rPr lang="en-US" dirty="0"/>
-              <a:t>Jay</a:t>
+              <a:t>Jay: “We will now test the program by using Eclipse.”</a:t>
+            </a:r>
+          </a:p>
+          <a:p>
+            <a:r>
+              <a:rPr lang="en-US" dirty="0"/>
+              <a:t>Move to Eclipse to run Program</a:t>
             </a:r>
           </a:p>
         </p:txBody>
@@ -1935,7 +1984,7 @@
           <a:p>
             <a:r>
               <a:rPr lang="en-US" dirty="0"/>
-              <a:t>Jay</a:t>
+              <a:t>Jay: “So for this project, we decided to create three different classes that the program will use as well as a README file that also documents our engineering design process. Map.java would be the file that generates each of the major buildings on campus and performs the calculations for finding the center point, MapDisplay.java would be the file that creates the display box that allows the program to be used, and Main.java would initialize the map object and start the program.”</a:t>
             </a:r>
           </a:p>
         </p:txBody>
@@ -2027,7 +2076,7 @@
           <a:p>
             <a:r>
               <a:rPr lang="en-US" dirty="0"/>
-              <a:t>Jay</a:t>
+              <a:t>Jay: “At the end of our prototype’s construction, we successfully managed to have Map.java find the center point location as well as the next two best locations and finished the GUI box within the Map Display.java file. Main.java needed no editing after the initial creation.”</a:t>
             </a:r>
           </a:p>
         </p:txBody>
@@ -20562,20 +20611,20 @@
 </file>
 
 <file path=customXml/item1.xml><?xml version="1.0" encoding="utf-8"?>
+<p:properties xmlns:p="http://schemas.microsoft.com/office/2006/metadata/properties" xmlns:xsi="http://www.w3.org/2001/XMLSchema-instance" xmlns:pc="http://schemas.microsoft.com/office/infopath/2007/PartnerControls">
+  <documentManagement>
+    <MediaServiceKeyPoints xmlns="71af3243-3dd4-4a8d-8c0d-dd76da1f02a5" xsi:nil="true"/>
+  </documentManagement>
+</p:properties>
+</file>
+
+<file path=customXml/item2.xml><?xml version="1.0" encoding="utf-8"?>
 <?mso-contentType ?>
 <FormTemplates xmlns="http://schemas.microsoft.com/sharepoint/v3/contenttype/forms">
   <Display>DocumentLibraryForm</Display>
   <Edit>DocumentLibraryForm</Edit>
   <New>DocumentLibraryForm</New>
 </FormTemplates>
-</file>
-
-<file path=customXml/item2.xml><?xml version="1.0" encoding="utf-8"?>
-<p:properties xmlns:p="http://schemas.microsoft.com/office/2006/metadata/properties" xmlns:xsi="http://www.w3.org/2001/XMLSchema-instance" xmlns:pc="http://schemas.microsoft.com/office/infopath/2007/PartnerControls">
-  <documentManagement>
-    <MediaServiceKeyPoints xmlns="71af3243-3dd4-4a8d-8c0d-dd76da1f02a5" xsi:nil="true"/>
-  </documentManagement>
-</p:properties>
 </file>
 
 <file path=customXml/item3.xml><?xml version="1.0" encoding="utf-8"?>
@@ -20790,14 +20839,6 @@
 </file>
 
 <file path=customXml/itemProps1.xml><?xml version="1.0" encoding="utf-8"?>
-<ds:datastoreItem xmlns:ds="http://schemas.openxmlformats.org/officeDocument/2006/customXml" ds:itemID="{2FD05317-60D6-4B3A-8545-888496D1A8EC}">
-  <ds:schemaRefs>
-    <ds:schemaRef ds:uri="http://schemas.microsoft.com/sharepoint/v3/contenttype/forms"/>
-  </ds:schemaRefs>
-</ds:datastoreItem>
-</file>
-
-<file path=customXml/itemProps2.xml><?xml version="1.0" encoding="utf-8"?>
 <ds:datastoreItem xmlns:ds="http://schemas.openxmlformats.org/officeDocument/2006/customXml" ds:itemID="{EF609EDA-869E-4BE5-AE5D-B898C584B6FF}">
   <ds:schemaRefs>
     <ds:schemaRef ds:uri="http://purl.org/dc/terms/"/>
@@ -20810,6 +20851,14 @@
     <ds:schemaRef ds:uri="71af3243-3dd4-4a8d-8c0d-dd76da1f02a5"/>
     <ds:schemaRef ds:uri="http://www.w3.org/XML/1998/namespace"/>
     <ds:schemaRef ds:uri="http://purl.org/dc/dcmitype/"/>
+  </ds:schemaRefs>
+</ds:datastoreItem>
+</file>
+
+<file path=customXml/itemProps2.xml><?xml version="1.0" encoding="utf-8"?>
+<ds:datastoreItem xmlns:ds="http://schemas.openxmlformats.org/officeDocument/2006/customXml" ds:itemID="{2FD05317-60D6-4B3A-8545-888496D1A8EC}">
+  <ds:schemaRefs>
+    <ds:schemaRef ds:uri="http://schemas.microsoft.com/sharepoint/v3/contenttype/forms"/>
   </ds:schemaRefs>
 </ds:datastoreItem>
 </file>

</xml_diff>